<commit_message>
clean session-4 layout + enablers and challenges
</commit_message>
<xml_diff>
--- a/presentations/session-11-business-models-iot-ai.pptx
+++ b/presentations/session-11-business-models-iot-ai.pptx
@@ -5,21 +5,12 @@
     <p:sldMasterId id="2147483648" r:id="rId1"/>
   </p:sldMasterIdLst>
   <p:notesMasterIdLst>
-    <p:notesMasterId r:id="rId14"/>
+    <p:notesMasterId r:id="rId5"/>
   </p:notesMasterIdLst>
   <p:sldIdLst>
     <p:sldId id="263" r:id="rId2"/>
     <p:sldId id="538" r:id="rId3"/>
     <p:sldId id="542" r:id="rId4"/>
-    <p:sldId id="556" r:id="rId5"/>
-    <p:sldId id="564" r:id="rId6"/>
-    <p:sldId id="566" r:id="rId7"/>
-    <p:sldId id="558" r:id="rId8"/>
-    <p:sldId id="559" r:id="rId9"/>
-    <p:sldId id="560" r:id="rId10"/>
-    <p:sldId id="561" r:id="rId11"/>
-    <p:sldId id="562" r:id="rId12"/>
-    <p:sldId id="563" r:id="rId13"/>
   </p:sldIdLst>
   <p:sldSz cx="12192000" cy="6858000"/>
   <p:notesSz cx="6797675" cy="9874250"/>
@@ -570,258 +561,6 @@
 </p:notes>
 </file>
 
-<file path=ppt/notesSlides/notesSlide10.xml><?xml version="1.0" encoding="utf-8"?>
-<p:notes xmlns:a="http://schemas.openxmlformats.org/drawingml/2006/main" xmlns:r="http://schemas.openxmlformats.org/officeDocument/2006/relationships" xmlns:p="http://schemas.openxmlformats.org/presentationml/2006/main">
-  <p:cSld>
-    <p:spTree>
-      <p:nvGrpSpPr>
-        <p:cNvPr id="1" name=""/>
-        <p:cNvGrpSpPr/>
-        <p:nvPr/>
-      </p:nvGrpSpPr>
-      <p:grpSpPr>
-        <a:xfrm>
-          <a:off x="0" y="0"/>
-          <a:ext cx="0" cy="0"/>
-          <a:chOff x="0" y="0"/>
-          <a:chExt cx="0" cy="0"/>
-        </a:xfrm>
-      </p:grpSpPr>
-      <p:sp>
-        <p:nvSpPr>
-          <p:cNvPr id="2" name="Slide Image Placeholder 1"/>
-          <p:cNvSpPr>
-            <a:spLocks noGrp="1" noRot="1" noChangeAspect="1"/>
-          </p:cNvSpPr>
-          <p:nvPr>
-            <p:ph type="sldImg"/>
-          </p:nvPr>
-        </p:nvSpPr>
-        <p:spPr/>
-      </p:sp>
-      <p:sp>
-        <p:nvSpPr>
-          <p:cNvPr id="3" name="Notes Placeholder 2"/>
-          <p:cNvSpPr>
-            <a:spLocks noGrp="1"/>
-          </p:cNvSpPr>
-          <p:nvPr>
-            <p:ph type="body" idx="1"/>
-          </p:nvPr>
-        </p:nvSpPr>
-        <p:spPr/>
-        <p:txBody>
-          <a:bodyPr/>
-          <a:lstStyle/>
-          <a:p>
-            <a:endParaRPr lang="en-US" dirty="0"/>
-          </a:p>
-        </p:txBody>
-      </p:sp>
-      <p:sp>
-        <p:nvSpPr>
-          <p:cNvPr id="4" name="Slide Number Placeholder 3"/>
-          <p:cNvSpPr>
-            <a:spLocks noGrp="1"/>
-          </p:cNvSpPr>
-          <p:nvPr>
-            <p:ph type="sldNum" sz="quarter" idx="10"/>
-          </p:nvPr>
-        </p:nvSpPr>
-        <p:spPr/>
-        <p:txBody>
-          <a:bodyPr/>
-          <a:lstStyle/>
-          <a:p>
-            <a:fld id="{2F6F93F9-6E01-423B-ABB3-8FB3B0651941}" type="slidenum">
-              <a:rPr lang="en-US" smtClean="0"/>
-              <a:t>10</a:t>
-            </a:fld>
-            <a:endParaRPr lang="en-US"/>
-          </a:p>
-        </p:txBody>
-      </p:sp>
-    </p:spTree>
-    <p:extLst>
-      <p:ext uri="{BB962C8B-B14F-4D97-AF65-F5344CB8AC3E}">
-        <p14:creationId xmlns:p14="http://schemas.microsoft.com/office/powerpoint/2010/main" val="467430118"/>
-      </p:ext>
-    </p:extLst>
-  </p:cSld>
-  <p:clrMapOvr>
-    <a:masterClrMapping/>
-  </p:clrMapOvr>
-</p:notes>
-</file>
-
-<file path=ppt/notesSlides/notesSlide11.xml><?xml version="1.0" encoding="utf-8"?>
-<p:notes xmlns:a="http://schemas.openxmlformats.org/drawingml/2006/main" xmlns:r="http://schemas.openxmlformats.org/officeDocument/2006/relationships" xmlns:p="http://schemas.openxmlformats.org/presentationml/2006/main">
-  <p:cSld>
-    <p:spTree>
-      <p:nvGrpSpPr>
-        <p:cNvPr id="1" name=""/>
-        <p:cNvGrpSpPr/>
-        <p:nvPr/>
-      </p:nvGrpSpPr>
-      <p:grpSpPr>
-        <a:xfrm>
-          <a:off x="0" y="0"/>
-          <a:ext cx="0" cy="0"/>
-          <a:chOff x="0" y="0"/>
-          <a:chExt cx="0" cy="0"/>
-        </a:xfrm>
-      </p:grpSpPr>
-      <p:sp>
-        <p:nvSpPr>
-          <p:cNvPr id="2" name="Slide Image Placeholder 1"/>
-          <p:cNvSpPr>
-            <a:spLocks noGrp="1" noRot="1" noChangeAspect="1"/>
-          </p:cNvSpPr>
-          <p:nvPr>
-            <p:ph type="sldImg"/>
-          </p:nvPr>
-        </p:nvSpPr>
-        <p:spPr/>
-      </p:sp>
-      <p:sp>
-        <p:nvSpPr>
-          <p:cNvPr id="3" name="Notes Placeholder 2"/>
-          <p:cNvSpPr>
-            <a:spLocks noGrp="1"/>
-          </p:cNvSpPr>
-          <p:nvPr>
-            <p:ph type="body" idx="1"/>
-          </p:nvPr>
-        </p:nvSpPr>
-        <p:spPr/>
-        <p:txBody>
-          <a:bodyPr/>
-          <a:lstStyle/>
-          <a:p>
-            <a:endParaRPr lang="en-US" dirty="0"/>
-          </a:p>
-        </p:txBody>
-      </p:sp>
-      <p:sp>
-        <p:nvSpPr>
-          <p:cNvPr id="4" name="Slide Number Placeholder 3"/>
-          <p:cNvSpPr>
-            <a:spLocks noGrp="1"/>
-          </p:cNvSpPr>
-          <p:nvPr>
-            <p:ph type="sldNum" sz="quarter" idx="10"/>
-          </p:nvPr>
-        </p:nvSpPr>
-        <p:spPr/>
-        <p:txBody>
-          <a:bodyPr/>
-          <a:lstStyle/>
-          <a:p>
-            <a:fld id="{2F6F93F9-6E01-423B-ABB3-8FB3B0651941}" type="slidenum">
-              <a:rPr lang="en-US" smtClean="0"/>
-              <a:t>11</a:t>
-            </a:fld>
-            <a:endParaRPr lang="en-US"/>
-          </a:p>
-        </p:txBody>
-      </p:sp>
-    </p:spTree>
-    <p:extLst>
-      <p:ext uri="{BB962C8B-B14F-4D97-AF65-F5344CB8AC3E}">
-        <p14:creationId xmlns:p14="http://schemas.microsoft.com/office/powerpoint/2010/main" val="1092752190"/>
-      </p:ext>
-    </p:extLst>
-  </p:cSld>
-  <p:clrMapOvr>
-    <a:masterClrMapping/>
-  </p:clrMapOvr>
-</p:notes>
-</file>
-
-<file path=ppt/notesSlides/notesSlide12.xml><?xml version="1.0" encoding="utf-8"?>
-<p:notes xmlns:a="http://schemas.openxmlformats.org/drawingml/2006/main" xmlns:r="http://schemas.openxmlformats.org/officeDocument/2006/relationships" xmlns:p="http://schemas.openxmlformats.org/presentationml/2006/main">
-  <p:cSld>
-    <p:spTree>
-      <p:nvGrpSpPr>
-        <p:cNvPr id="1" name=""/>
-        <p:cNvGrpSpPr/>
-        <p:nvPr/>
-      </p:nvGrpSpPr>
-      <p:grpSpPr>
-        <a:xfrm>
-          <a:off x="0" y="0"/>
-          <a:ext cx="0" cy="0"/>
-          <a:chOff x="0" y="0"/>
-          <a:chExt cx="0" cy="0"/>
-        </a:xfrm>
-      </p:grpSpPr>
-      <p:sp>
-        <p:nvSpPr>
-          <p:cNvPr id="2" name="Slide Image Placeholder 1"/>
-          <p:cNvSpPr>
-            <a:spLocks noGrp="1" noRot="1" noChangeAspect="1"/>
-          </p:cNvSpPr>
-          <p:nvPr>
-            <p:ph type="sldImg"/>
-          </p:nvPr>
-        </p:nvSpPr>
-        <p:spPr/>
-      </p:sp>
-      <p:sp>
-        <p:nvSpPr>
-          <p:cNvPr id="3" name="Notes Placeholder 2"/>
-          <p:cNvSpPr>
-            <a:spLocks noGrp="1"/>
-          </p:cNvSpPr>
-          <p:nvPr>
-            <p:ph type="body" idx="1"/>
-          </p:nvPr>
-        </p:nvSpPr>
-        <p:spPr/>
-        <p:txBody>
-          <a:bodyPr/>
-          <a:lstStyle/>
-          <a:p>
-            <a:endParaRPr lang="en-US" dirty="0"/>
-          </a:p>
-        </p:txBody>
-      </p:sp>
-      <p:sp>
-        <p:nvSpPr>
-          <p:cNvPr id="4" name="Slide Number Placeholder 3"/>
-          <p:cNvSpPr>
-            <a:spLocks noGrp="1"/>
-          </p:cNvSpPr>
-          <p:nvPr>
-            <p:ph type="sldNum" sz="quarter" idx="10"/>
-          </p:nvPr>
-        </p:nvSpPr>
-        <p:spPr/>
-        <p:txBody>
-          <a:bodyPr/>
-          <a:lstStyle/>
-          <a:p>
-            <a:fld id="{2F6F93F9-6E01-423B-ABB3-8FB3B0651941}" type="slidenum">
-              <a:rPr lang="en-US" smtClean="0"/>
-              <a:t>12</a:t>
-            </a:fld>
-            <a:endParaRPr lang="en-US"/>
-          </a:p>
-        </p:txBody>
-      </p:sp>
-    </p:spTree>
-    <p:extLst>
-      <p:ext uri="{BB962C8B-B14F-4D97-AF65-F5344CB8AC3E}">
-        <p14:creationId xmlns:p14="http://schemas.microsoft.com/office/powerpoint/2010/main" val="1594068714"/>
-      </p:ext>
-    </p:extLst>
-  </p:cSld>
-  <p:clrMapOvr>
-    <a:masterClrMapping/>
-  </p:clrMapOvr>
-</p:notes>
-</file>
-
 <file path=ppt/notesSlides/notesSlide2.xml><?xml version="1.0" encoding="utf-8"?>
 <p:notes xmlns:a="http://schemas.openxmlformats.org/drawingml/2006/main" xmlns:r="http://schemas.openxmlformats.org/officeDocument/2006/relationships" xmlns:p="http://schemas.openxmlformats.org/presentationml/2006/main">
   <p:cSld>
@@ -985,510 +724,6 @@
     <p:extLst>
       <p:ext uri="{BB962C8B-B14F-4D97-AF65-F5344CB8AC3E}">
         <p14:creationId xmlns:p14="http://schemas.microsoft.com/office/powerpoint/2010/main" val="2558065195"/>
-      </p:ext>
-    </p:extLst>
-  </p:cSld>
-  <p:clrMapOvr>
-    <a:masterClrMapping/>
-  </p:clrMapOvr>
-</p:notes>
-</file>
-
-<file path=ppt/notesSlides/notesSlide4.xml><?xml version="1.0" encoding="utf-8"?>
-<p:notes xmlns:a="http://schemas.openxmlformats.org/drawingml/2006/main" xmlns:r="http://schemas.openxmlformats.org/officeDocument/2006/relationships" xmlns:p="http://schemas.openxmlformats.org/presentationml/2006/main">
-  <p:cSld>
-    <p:spTree>
-      <p:nvGrpSpPr>
-        <p:cNvPr id="1" name=""/>
-        <p:cNvGrpSpPr/>
-        <p:nvPr/>
-      </p:nvGrpSpPr>
-      <p:grpSpPr>
-        <a:xfrm>
-          <a:off x="0" y="0"/>
-          <a:ext cx="0" cy="0"/>
-          <a:chOff x="0" y="0"/>
-          <a:chExt cx="0" cy="0"/>
-        </a:xfrm>
-      </p:grpSpPr>
-      <p:sp>
-        <p:nvSpPr>
-          <p:cNvPr id="2" name="Slide Image Placeholder 1"/>
-          <p:cNvSpPr>
-            <a:spLocks noGrp="1" noRot="1" noChangeAspect="1"/>
-          </p:cNvSpPr>
-          <p:nvPr>
-            <p:ph type="sldImg"/>
-          </p:nvPr>
-        </p:nvSpPr>
-        <p:spPr/>
-      </p:sp>
-      <p:sp>
-        <p:nvSpPr>
-          <p:cNvPr id="3" name="Notes Placeholder 2"/>
-          <p:cNvSpPr>
-            <a:spLocks noGrp="1"/>
-          </p:cNvSpPr>
-          <p:nvPr>
-            <p:ph type="body" idx="1"/>
-          </p:nvPr>
-        </p:nvSpPr>
-        <p:spPr/>
-        <p:txBody>
-          <a:bodyPr/>
-          <a:lstStyle/>
-          <a:p>
-            <a:endParaRPr lang="en-US" dirty="0"/>
-          </a:p>
-        </p:txBody>
-      </p:sp>
-      <p:sp>
-        <p:nvSpPr>
-          <p:cNvPr id="4" name="Slide Number Placeholder 3"/>
-          <p:cNvSpPr>
-            <a:spLocks noGrp="1"/>
-          </p:cNvSpPr>
-          <p:nvPr>
-            <p:ph type="sldNum" sz="quarter" idx="10"/>
-          </p:nvPr>
-        </p:nvSpPr>
-        <p:spPr/>
-        <p:txBody>
-          <a:bodyPr/>
-          <a:lstStyle/>
-          <a:p>
-            <a:fld id="{2F6F93F9-6E01-423B-ABB3-8FB3B0651941}" type="slidenum">
-              <a:rPr lang="en-US" smtClean="0"/>
-              <a:t>4</a:t>
-            </a:fld>
-            <a:endParaRPr lang="en-US"/>
-          </a:p>
-        </p:txBody>
-      </p:sp>
-    </p:spTree>
-    <p:extLst>
-      <p:ext uri="{BB962C8B-B14F-4D97-AF65-F5344CB8AC3E}">
-        <p14:creationId xmlns:p14="http://schemas.microsoft.com/office/powerpoint/2010/main" val="2170746578"/>
-      </p:ext>
-    </p:extLst>
-  </p:cSld>
-  <p:clrMapOvr>
-    <a:masterClrMapping/>
-  </p:clrMapOvr>
-</p:notes>
-</file>
-
-<file path=ppt/notesSlides/notesSlide5.xml><?xml version="1.0" encoding="utf-8"?>
-<p:notes xmlns:a="http://schemas.openxmlformats.org/drawingml/2006/main" xmlns:r="http://schemas.openxmlformats.org/officeDocument/2006/relationships" xmlns:p="http://schemas.openxmlformats.org/presentationml/2006/main">
-  <p:cSld>
-    <p:spTree>
-      <p:nvGrpSpPr>
-        <p:cNvPr id="1" name=""/>
-        <p:cNvGrpSpPr/>
-        <p:nvPr/>
-      </p:nvGrpSpPr>
-      <p:grpSpPr>
-        <a:xfrm>
-          <a:off x="0" y="0"/>
-          <a:ext cx="0" cy="0"/>
-          <a:chOff x="0" y="0"/>
-          <a:chExt cx="0" cy="0"/>
-        </a:xfrm>
-      </p:grpSpPr>
-      <p:sp>
-        <p:nvSpPr>
-          <p:cNvPr id="2" name="Slide Image Placeholder 1"/>
-          <p:cNvSpPr>
-            <a:spLocks noGrp="1" noRot="1" noChangeAspect="1"/>
-          </p:cNvSpPr>
-          <p:nvPr>
-            <p:ph type="sldImg"/>
-          </p:nvPr>
-        </p:nvSpPr>
-        <p:spPr/>
-      </p:sp>
-      <p:sp>
-        <p:nvSpPr>
-          <p:cNvPr id="3" name="Notes Placeholder 2"/>
-          <p:cNvSpPr>
-            <a:spLocks noGrp="1"/>
-          </p:cNvSpPr>
-          <p:nvPr>
-            <p:ph type="body" idx="1"/>
-          </p:nvPr>
-        </p:nvSpPr>
-        <p:spPr/>
-        <p:txBody>
-          <a:bodyPr/>
-          <a:lstStyle/>
-          <a:p>
-            <a:endParaRPr lang="en-US" dirty="0"/>
-          </a:p>
-        </p:txBody>
-      </p:sp>
-      <p:sp>
-        <p:nvSpPr>
-          <p:cNvPr id="4" name="Slide Number Placeholder 3"/>
-          <p:cNvSpPr>
-            <a:spLocks noGrp="1"/>
-          </p:cNvSpPr>
-          <p:nvPr>
-            <p:ph type="sldNum" sz="quarter" idx="10"/>
-          </p:nvPr>
-        </p:nvSpPr>
-        <p:spPr/>
-        <p:txBody>
-          <a:bodyPr/>
-          <a:lstStyle/>
-          <a:p>
-            <a:fld id="{2F6F93F9-6E01-423B-ABB3-8FB3B0651941}" type="slidenum">
-              <a:rPr lang="en-US" smtClean="0"/>
-              <a:t>5</a:t>
-            </a:fld>
-            <a:endParaRPr lang="en-US"/>
-          </a:p>
-        </p:txBody>
-      </p:sp>
-    </p:spTree>
-    <p:extLst>
-      <p:ext uri="{BB962C8B-B14F-4D97-AF65-F5344CB8AC3E}">
-        <p14:creationId xmlns:p14="http://schemas.microsoft.com/office/powerpoint/2010/main" val="2999805621"/>
-      </p:ext>
-    </p:extLst>
-  </p:cSld>
-  <p:clrMapOvr>
-    <a:masterClrMapping/>
-  </p:clrMapOvr>
-</p:notes>
-</file>
-
-<file path=ppt/notesSlides/notesSlide6.xml><?xml version="1.0" encoding="utf-8"?>
-<p:notes xmlns:a="http://schemas.openxmlformats.org/drawingml/2006/main" xmlns:r="http://schemas.openxmlformats.org/officeDocument/2006/relationships" xmlns:p="http://schemas.openxmlformats.org/presentationml/2006/main">
-  <p:cSld>
-    <p:spTree>
-      <p:nvGrpSpPr>
-        <p:cNvPr id="1" name=""/>
-        <p:cNvGrpSpPr/>
-        <p:nvPr/>
-      </p:nvGrpSpPr>
-      <p:grpSpPr>
-        <a:xfrm>
-          <a:off x="0" y="0"/>
-          <a:ext cx="0" cy="0"/>
-          <a:chOff x="0" y="0"/>
-          <a:chExt cx="0" cy="0"/>
-        </a:xfrm>
-      </p:grpSpPr>
-      <p:sp>
-        <p:nvSpPr>
-          <p:cNvPr id="2" name="Slide Image Placeholder 1"/>
-          <p:cNvSpPr>
-            <a:spLocks noGrp="1" noRot="1" noChangeAspect="1"/>
-          </p:cNvSpPr>
-          <p:nvPr>
-            <p:ph type="sldImg"/>
-          </p:nvPr>
-        </p:nvSpPr>
-        <p:spPr/>
-      </p:sp>
-      <p:sp>
-        <p:nvSpPr>
-          <p:cNvPr id="3" name="Notes Placeholder 2"/>
-          <p:cNvSpPr>
-            <a:spLocks noGrp="1"/>
-          </p:cNvSpPr>
-          <p:nvPr>
-            <p:ph type="body" idx="1"/>
-          </p:nvPr>
-        </p:nvSpPr>
-        <p:spPr/>
-        <p:txBody>
-          <a:bodyPr/>
-          <a:lstStyle/>
-          <a:p>
-            <a:endParaRPr lang="en-US" dirty="0"/>
-          </a:p>
-        </p:txBody>
-      </p:sp>
-      <p:sp>
-        <p:nvSpPr>
-          <p:cNvPr id="4" name="Slide Number Placeholder 3"/>
-          <p:cNvSpPr>
-            <a:spLocks noGrp="1"/>
-          </p:cNvSpPr>
-          <p:nvPr>
-            <p:ph type="sldNum" sz="quarter" idx="10"/>
-          </p:nvPr>
-        </p:nvSpPr>
-        <p:spPr/>
-        <p:txBody>
-          <a:bodyPr/>
-          <a:lstStyle/>
-          <a:p>
-            <a:fld id="{2F6F93F9-6E01-423B-ABB3-8FB3B0651941}" type="slidenum">
-              <a:rPr lang="en-US" smtClean="0"/>
-              <a:t>6</a:t>
-            </a:fld>
-            <a:endParaRPr lang="en-US"/>
-          </a:p>
-        </p:txBody>
-      </p:sp>
-    </p:spTree>
-    <p:extLst>
-      <p:ext uri="{BB962C8B-B14F-4D97-AF65-F5344CB8AC3E}">
-        <p14:creationId xmlns:p14="http://schemas.microsoft.com/office/powerpoint/2010/main" val="766438252"/>
-      </p:ext>
-    </p:extLst>
-  </p:cSld>
-  <p:clrMapOvr>
-    <a:masterClrMapping/>
-  </p:clrMapOvr>
-</p:notes>
-</file>
-
-<file path=ppt/notesSlides/notesSlide7.xml><?xml version="1.0" encoding="utf-8"?>
-<p:notes xmlns:a="http://schemas.openxmlformats.org/drawingml/2006/main" xmlns:r="http://schemas.openxmlformats.org/officeDocument/2006/relationships" xmlns:p="http://schemas.openxmlformats.org/presentationml/2006/main">
-  <p:cSld>
-    <p:spTree>
-      <p:nvGrpSpPr>
-        <p:cNvPr id="1" name=""/>
-        <p:cNvGrpSpPr/>
-        <p:nvPr/>
-      </p:nvGrpSpPr>
-      <p:grpSpPr>
-        <a:xfrm>
-          <a:off x="0" y="0"/>
-          <a:ext cx="0" cy="0"/>
-          <a:chOff x="0" y="0"/>
-          <a:chExt cx="0" cy="0"/>
-        </a:xfrm>
-      </p:grpSpPr>
-      <p:sp>
-        <p:nvSpPr>
-          <p:cNvPr id="2" name="Slide Image Placeholder 1"/>
-          <p:cNvSpPr>
-            <a:spLocks noGrp="1" noRot="1" noChangeAspect="1"/>
-          </p:cNvSpPr>
-          <p:nvPr>
-            <p:ph type="sldImg"/>
-          </p:nvPr>
-        </p:nvSpPr>
-        <p:spPr/>
-      </p:sp>
-      <p:sp>
-        <p:nvSpPr>
-          <p:cNvPr id="3" name="Notes Placeholder 2"/>
-          <p:cNvSpPr>
-            <a:spLocks noGrp="1"/>
-          </p:cNvSpPr>
-          <p:nvPr>
-            <p:ph type="body" idx="1"/>
-          </p:nvPr>
-        </p:nvSpPr>
-        <p:spPr/>
-        <p:txBody>
-          <a:bodyPr/>
-          <a:lstStyle/>
-          <a:p>
-            <a:endParaRPr lang="en-US" dirty="0"/>
-          </a:p>
-        </p:txBody>
-      </p:sp>
-      <p:sp>
-        <p:nvSpPr>
-          <p:cNvPr id="4" name="Slide Number Placeholder 3"/>
-          <p:cNvSpPr>
-            <a:spLocks noGrp="1"/>
-          </p:cNvSpPr>
-          <p:nvPr>
-            <p:ph type="sldNum" sz="quarter" idx="10"/>
-          </p:nvPr>
-        </p:nvSpPr>
-        <p:spPr/>
-        <p:txBody>
-          <a:bodyPr/>
-          <a:lstStyle/>
-          <a:p>
-            <a:fld id="{2F6F93F9-6E01-423B-ABB3-8FB3B0651941}" type="slidenum">
-              <a:rPr lang="en-US" smtClean="0"/>
-              <a:t>7</a:t>
-            </a:fld>
-            <a:endParaRPr lang="en-US"/>
-          </a:p>
-        </p:txBody>
-      </p:sp>
-    </p:spTree>
-    <p:extLst>
-      <p:ext uri="{BB962C8B-B14F-4D97-AF65-F5344CB8AC3E}">
-        <p14:creationId xmlns:p14="http://schemas.microsoft.com/office/powerpoint/2010/main" val="2780719010"/>
-      </p:ext>
-    </p:extLst>
-  </p:cSld>
-  <p:clrMapOvr>
-    <a:masterClrMapping/>
-  </p:clrMapOvr>
-</p:notes>
-</file>
-
-<file path=ppt/notesSlides/notesSlide8.xml><?xml version="1.0" encoding="utf-8"?>
-<p:notes xmlns:a="http://schemas.openxmlformats.org/drawingml/2006/main" xmlns:r="http://schemas.openxmlformats.org/officeDocument/2006/relationships" xmlns:p="http://schemas.openxmlformats.org/presentationml/2006/main">
-  <p:cSld>
-    <p:spTree>
-      <p:nvGrpSpPr>
-        <p:cNvPr id="1" name=""/>
-        <p:cNvGrpSpPr/>
-        <p:nvPr/>
-      </p:nvGrpSpPr>
-      <p:grpSpPr>
-        <a:xfrm>
-          <a:off x="0" y="0"/>
-          <a:ext cx="0" cy="0"/>
-          <a:chOff x="0" y="0"/>
-          <a:chExt cx="0" cy="0"/>
-        </a:xfrm>
-      </p:grpSpPr>
-      <p:sp>
-        <p:nvSpPr>
-          <p:cNvPr id="2" name="Slide Image Placeholder 1"/>
-          <p:cNvSpPr>
-            <a:spLocks noGrp="1" noRot="1" noChangeAspect="1"/>
-          </p:cNvSpPr>
-          <p:nvPr>
-            <p:ph type="sldImg"/>
-          </p:nvPr>
-        </p:nvSpPr>
-        <p:spPr/>
-      </p:sp>
-      <p:sp>
-        <p:nvSpPr>
-          <p:cNvPr id="3" name="Notes Placeholder 2"/>
-          <p:cNvSpPr>
-            <a:spLocks noGrp="1"/>
-          </p:cNvSpPr>
-          <p:nvPr>
-            <p:ph type="body" idx="1"/>
-          </p:nvPr>
-        </p:nvSpPr>
-        <p:spPr/>
-        <p:txBody>
-          <a:bodyPr/>
-          <a:lstStyle/>
-          <a:p>
-            <a:endParaRPr lang="en-US" dirty="0"/>
-          </a:p>
-        </p:txBody>
-      </p:sp>
-      <p:sp>
-        <p:nvSpPr>
-          <p:cNvPr id="4" name="Slide Number Placeholder 3"/>
-          <p:cNvSpPr>
-            <a:spLocks noGrp="1"/>
-          </p:cNvSpPr>
-          <p:nvPr>
-            <p:ph type="sldNum" sz="quarter" idx="10"/>
-          </p:nvPr>
-        </p:nvSpPr>
-        <p:spPr/>
-        <p:txBody>
-          <a:bodyPr/>
-          <a:lstStyle/>
-          <a:p>
-            <a:fld id="{2F6F93F9-6E01-423B-ABB3-8FB3B0651941}" type="slidenum">
-              <a:rPr lang="en-US" smtClean="0"/>
-              <a:t>8</a:t>
-            </a:fld>
-            <a:endParaRPr lang="en-US"/>
-          </a:p>
-        </p:txBody>
-      </p:sp>
-    </p:spTree>
-    <p:extLst>
-      <p:ext uri="{BB962C8B-B14F-4D97-AF65-F5344CB8AC3E}">
-        <p14:creationId xmlns:p14="http://schemas.microsoft.com/office/powerpoint/2010/main" val="1426491306"/>
-      </p:ext>
-    </p:extLst>
-  </p:cSld>
-  <p:clrMapOvr>
-    <a:masterClrMapping/>
-  </p:clrMapOvr>
-</p:notes>
-</file>
-
-<file path=ppt/notesSlides/notesSlide9.xml><?xml version="1.0" encoding="utf-8"?>
-<p:notes xmlns:a="http://schemas.openxmlformats.org/drawingml/2006/main" xmlns:r="http://schemas.openxmlformats.org/officeDocument/2006/relationships" xmlns:p="http://schemas.openxmlformats.org/presentationml/2006/main">
-  <p:cSld>
-    <p:spTree>
-      <p:nvGrpSpPr>
-        <p:cNvPr id="1" name=""/>
-        <p:cNvGrpSpPr/>
-        <p:nvPr/>
-      </p:nvGrpSpPr>
-      <p:grpSpPr>
-        <a:xfrm>
-          <a:off x="0" y="0"/>
-          <a:ext cx="0" cy="0"/>
-          <a:chOff x="0" y="0"/>
-          <a:chExt cx="0" cy="0"/>
-        </a:xfrm>
-      </p:grpSpPr>
-      <p:sp>
-        <p:nvSpPr>
-          <p:cNvPr id="2" name="Slide Image Placeholder 1"/>
-          <p:cNvSpPr>
-            <a:spLocks noGrp="1" noRot="1" noChangeAspect="1"/>
-          </p:cNvSpPr>
-          <p:nvPr>
-            <p:ph type="sldImg"/>
-          </p:nvPr>
-        </p:nvSpPr>
-        <p:spPr/>
-      </p:sp>
-      <p:sp>
-        <p:nvSpPr>
-          <p:cNvPr id="3" name="Notes Placeholder 2"/>
-          <p:cNvSpPr>
-            <a:spLocks noGrp="1"/>
-          </p:cNvSpPr>
-          <p:nvPr>
-            <p:ph type="body" idx="1"/>
-          </p:nvPr>
-        </p:nvSpPr>
-        <p:spPr/>
-        <p:txBody>
-          <a:bodyPr/>
-          <a:lstStyle/>
-          <a:p>
-            <a:endParaRPr lang="en-US" dirty="0"/>
-          </a:p>
-        </p:txBody>
-      </p:sp>
-      <p:sp>
-        <p:nvSpPr>
-          <p:cNvPr id="4" name="Slide Number Placeholder 3"/>
-          <p:cNvSpPr>
-            <a:spLocks noGrp="1"/>
-          </p:cNvSpPr>
-          <p:nvPr>
-            <p:ph type="sldNum" sz="quarter" idx="10"/>
-          </p:nvPr>
-        </p:nvSpPr>
-        <p:spPr/>
-        <p:txBody>
-          <a:bodyPr/>
-          <a:lstStyle/>
-          <a:p>
-            <a:fld id="{2F6F93F9-6E01-423B-ABB3-8FB3B0651941}" type="slidenum">
-              <a:rPr lang="en-US" smtClean="0"/>
-              <a:t>9</a:t>
-            </a:fld>
-            <a:endParaRPr lang="en-US"/>
-          </a:p>
-        </p:txBody>
-      </p:sp>
-    </p:spTree>
-    <p:extLst>
-      <p:ext uri="{BB962C8B-B14F-4D97-AF65-F5344CB8AC3E}">
-        <p14:creationId xmlns:p14="http://schemas.microsoft.com/office/powerpoint/2010/main" val="3917118602"/>
       </p:ext>
     </p:extLst>
   </p:cSld>
@@ -4121,7 +3356,7 @@
             <a:r>
               <a:rPr lang="en-US" sz="3200" b="1" dirty="0">
                 <a:solidFill>
-                  <a:srgbClr val="0F90D0"/>
+                  <a:schemeClr val="accent1"/>
                 </a:solidFill>
                 <a:latin typeface="Cambria" panose="02040503050406030204" pitchFamily="18" charset="0"/>
               </a:rPr>
@@ -4133,18 +3368,22 @@
             <a:r>
               <a:rPr lang="en-US" sz="3200" b="1" dirty="0">
                 <a:solidFill>
-                  <a:srgbClr val="0F90D0"/>
+                  <a:schemeClr val="accent1"/>
                 </a:solidFill>
                 <a:latin typeface="Cambria" panose="02040503050406030204" pitchFamily="18" charset="0"/>
               </a:rPr>
               <a:t>WORKSHOP ON EMERGING TECHNOLOGIES</a:t>
             </a:r>
-            <a:endParaRPr lang="en-US" sz="3200" dirty="0"/>
+            <a:endParaRPr lang="en-US" sz="3200" dirty="0">
+              <a:solidFill>
+                <a:schemeClr val="accent1"/>
+              </a:solidFill>
+            </a:endParaRPr>
           </a:p>
           <a:p>
             <a:endParaRPr lang="en-US" sz="3200" b="1" dirty="0">
               <a:solidFill>
-                <a:srgbClr val="0F90D0"/>
+                <a:schemeClr val="accent1"/>
               </a:solidFill>
               <a:latin typeface="Cambria" panose="02040503050406030204" pitchFamily="18" charset="0"/>
             </a:endParaRPr>
@@ -4152,7 +3391,7 @@
           <a:p>
             <a:endParaRPr lang="en-US" sz="3200" b="1" dirty="0">
               <a:solidFill>
-                <a:srgbClr val="0F90D0"/>
+                <a:schemeClr val="accent1"/>
               </a:solidFill>
               <a:latin typeface="Cambria" panose="02040503050406030204" pitchFamily="18" charset="0"/>
             </a:endParaRPr>
@@ -4161,15 +3400,15 @@
             <a:r>
               <a:rPr lang="en-US" sz="3200" b="1" dirty="0">
                 <a:solidFill>
-                  <a:srgbClr val="0F90D0"/>
+                  <a:schemeClr val="accent1"/>
                 </a:solidFill>
                 <a:latin typeface="Cambria" panose="02040503050406030204" pitchFamily="18" charset="0"/>
               </a:rPr>
-              <a:t>SESSION 9: OPEN ISSUES IN AI</a:t>
+              <a:t>SESSION 10: IoT - AI BUSINESS MODELS</a:t>
             </a:r>
             <a:endParaRPr lang="en-US" sz="3200" dirty="0">
               <a:solidFill>
-                <a:srgbClr val="0F90D0"/>
+                <a:schemeClr val="accent1"/>
               </a:solidFill>
               <a:latin typeface="Cambria" panose="02040503050406030204" pitchFamily="18" charset="0"/>
             </a:endParaRPr>
@@ -4240,234 +3479,6 @@
   <p:clrMapOvr>
     <a:masterClrMapping/>
   </p:clrMapOvr>
-</p:sld>
-</file>
-
-<file path=ppt/slides/slide10.xml><?xml version="1.0" encoding="utf-8"?>
-<p:sld xmlns:a="http://schemas.openxmlformats.org/drawingml/2006/main" xmlns:r="http://schemas.openxmlformats.org/officeDocument/2006/relationships" xmlns:p="http://schemas.openxmlformats.org/presentationml/2006/main">
-  <p:cSld>
-    <p:spTree>
-      <p:nvGrpSpPr>
-        <p:cNvPr id="1" name=""/>
-        <p:cNvGrpSpPr/>
-        <p:nvPr/>
-      </p:nvGrpSpPr>
-      <p:grpSpPr>
-        <a:xfrm>
-          <a:off x="0" y="0"/>
-          <a:ext cx="0" cy="0"/>
-          <a:chOff x="0" y="0"/>
-          <a:chExt cx="0" cy="0"/>
-        </a:xfrm>
-      </p:grpSpPr>
-      <p:sp>
-        <p:nvSpPr>
-          <p:cNvPr id="8" name="TextBox 7"/>
-          <p:cNvSpPr txBox="1"/>
-          <p:nvPr/>
-        </p:nvSpPr>
-        <p:spPr>
-          <a:xfrm>
-            <a:off x="1271768" y="1115051"/>
-            <a:ext cx="9196386" cy="630942"/>
-          </a:xfrm>
-          <a:prstGeom prst="rect">
-            <a:avLst/>
-          </a:prstGeom>
-          <a:noFill/>
-        </p:spPr>
-        <p:txBody>
-          <a:bodyPr wrap="square" rtlCol="0">
-            <a:spAutoFit/>
-          </a:bodyPr>
-          <a:lstStyle/>
-          <a:p>
-            <a:r>
-              <a:rPr lang="en-US" sz="3500" b="1" dirty="0">
-                <a:solidFill>
-                  <a:schemeClr val="accent1"/>
-                </a:solidFill>
-                <a:latin typeface="Cambria" panose="02040503050406030204" pitchFamily="18" charset="0"/>
-              </a:rPr>
-              <a:t>THE WINNER-TAKE ALL ECONOMICS</a:t>
-            </a:r>
-          </a:p>
-        </p:txBody>
-      </p:sp>
-    </p:spTree>
-    <p:extLst>
-      <p:ext uri="{BB962C8B-B14F-4D97-AF65-F5344CB8AC3E}">
-        <p14:creationId xmlns:p14="http://schemas.microsoft.com/office/powerpoint/2010/main" val="3740597422"/>
-      </p:ext>
-    </p:extLst>
-  </p:cSld>
-  <p:clrMapOvr>
-    <a:masterClrMapping/>
-  </p:clrMapOvr>
-  <mc:AlternateContent xmlns:mc="http://schemas.openxmlformats.org/markup-compatibility/2006" xmlns:p14="http://schemas.microsoft.com/office/powerpoint/2010/main">
-    <mc:Choice Requires="p14">
-      <p:transition spd="med" p14:dur="700">
-        <p:fade/>
-      </p:transition>
-    </mc:Choice>
-    <mc:Fallback xmlns="">
-      <p:transition spd="med">
-        <p:fade/>
-      </p:transition>
-    </mc:Fallback>
-  </mc:AlternateContent>
-</p:sld>
-</file>
-
-<file path=ppt/slides/slide11.xml><?xml version="1.0" encoding="utf-8"?>
-<p:sld xmlns:a="http://schemas.openxmlformats.org/drawingml/2006/main" xmlns:r="http://schemas.openxmlformats.org/officeDocument/2006/relationships" xmlns:p="http://schemas.openxmlformats.org/presentationml/2006/main">
-  <p:cSld>
-    <p:spTree>
-      <p:nvGrpSpPr>
-        <p:cNvPr id="1" name=""/>
-        <p:cNvGrpSpPr/>
-        <p:nvPr/>
-      </p:nvGrpSpPr>
-      <p:grpSpPr>
-        <a:xfrm>
-          <a:off x="0" y="0"/>
-          <a:ext cx="0" cy="0"/>
-          <a:chOff x="0" y="0"/>
-          <a:chExt cx="0" cy="0"/>
-        </a:xfrm>
-      </p:grpSpPr>
-      <p:sp>
-        <p:nvSpPr>
-          <p:cNvPr id="8" name="TextBox 7"/>
-          <p:cNvSpPr txBox="1"/>
-          <p:nvPr/>
-        </p:nvSpPr>
-        <p:spPr>
-          <a:xfrm>
-            <a:off x="1271768" y="1115051"/>
-            <a:ext cx="9196386" cy="630942"/>
-          </a:xfrm>
-          <a:prstGeom prst="rect">
-            <a:avLst/>
-          </a:prstGeom>
-          <a:noFill/>
-        </p:spPr>
-        <p:txBody>
-          <a:bodyPr wrap="square" rtlCol="0">
-            <a:spAutoFit/>
-          </a:bodyPr>
-          <a:lstStyle/>
-          <a:p>
-            <a:r>
-              <a:rPr lang="en-US" sz="3500" b="1" dirty="0">
-                <a:solidFill>
-                  <a:schemeClr val="accent1"/>
-                </a:solidFill>
-                <a:latin typeface="Cambria" panose="02040503050406030204" pitchFamily="18" charset="0"/>
-              </a:rPr>
-              <a:t>MEDIA-ATTENTION DISTORTS REALITY</a:t>
-            </a:r>
-          </a:p>
-        </p:txBody>
-      </p:sp>
-    </p:spTree>
-    <p:extLst>
-      <p:ext uri="{BB962C8B-B14F-4D97-AF65-F5344CB8AC3E}">
-        <p14:creationId xmlns:p14="http://schemas.microsoft.com/office/powerpoint/2010/main" val="1704148243"/>
-      </p:ext>
-    </p:extLst>
-  </p:cSld>
-  <p:clrMapOvr>
-    <a:masterClrMapping/>
-  </p:clrMapOvr>
-  <mc:AlternateContent xmlns:mc="http://schemas.openxmlformats.org/markup-compatibility/2006" xmlns:p14="http://schemas.microsoft.com/office/powerpoint/2010/main">
-    <mc:Choice Requires="p14">
-      <p:transition spd="med" p14:dur="700">
-        <p:fade/>
-      </p:transition>
-    </mc:Choice>
-    <mc:Fallback xmlns="">
-      <p:transition spd="med">
-        <p:fade/>
-      </p:transition>
-    </mc:Fallback>
-  </mc:AlternateContent>
-</p:sld>
-</file>
-
-<file path=ppt/slides/slide12.xml><?xml version="1.0" encoding="utf-8"?>
-<p:sld xmlns:a="http://schemas.openxmlformats.org/drawingml/2006/main" xmlns:r="http://schemas.openxmlformats.org/officeDocument/2006/relationships" xmlns:p="http://schemas.openxmlformats.org/presentationml/2006/main">
-  <p:cSld>
-    <p:spTree>
-      <p:nvGrpSpPr>
-        <p:cNvPr id="1" name=""/>
-        <p:cNvGrpSpPr/>
-        <p:nvPr/>
-      </p:nvGrpSpPr>
-      <p:grpSpPr>
-        <a:xfrm>
-          <a:off x="0" y="0"/>
-          <a:ext cx="0" cy="0"/>
-          <a:chOff x="0" y="0"/>
-          <a:chExt cx="0" cy="0"/>
-        </a:xfrm>
-      </p:grpSpPr>
-      <p:sp>
-        <p:nvSpPr>
-          <p:cNvPr id="8" name="TextBox 7"/>
-          <p:cNvSpPr txBox="1"/>
-          <p:nvPr/>
-        </p:nvSpPr>
-        <p:spPr>
-          <a:xfrm>
-            <a:off x="1271768" y="1115051"/>
-            <a:ext cx="9196386" cy="630942"/>
-          </a:xfrm>
-          <a:prstGeom prst="rect">
-            <a:avLst/>
-          </a:prstGeom>
-          <a:noFill/>
-        </p:spPr>
-        <p:txBody>
-          <a:bodyPr wrap="square" rtlCol="0">
-            <a:spAutoFit/>
-          </a:bodyPr>
-          <a:lstStyle/>
-          <a:p>
-            <a:r>
-              <a:rPr lang="en-US" sz="3500" b="1" dirty="0">
-                <a:solidFill>
-                  <a:schemeClr val="accent1"/>
-                </a:solidFill>
-                <a:latin typeface="Cambria" panose="02040503050406030204" pitchFamily="18" charset="0"/>
-              </a:rPr>
-              <a:t>CAPACITIES: HUMAN + COMPUTING POWER</a:t>
-            </a:r>
-          </a:p>
-        </p:txBody>
-      </p:sp>
-    </p:spTree>
-    <p:extLst>
-      <p:ext uri="{BB962C8B-B14F-4D97-AF65-F5344CB8AC3E}">
-        <p14:creationId xmlns:p14="http://schemas.microsoft.com/office/powerpoint/2010/main" val="2923339881"/>
-      </p:ext>
-    </p:extLst>
-  </p:cSld>
-  <p:clrMapOvr>
-    <a:masterClrMapping/>
-  </p:clrMapOvr>
-  <mc:AlternateContent xmlns:mc="http://schemas.openxmlformats.org/markup-compatibility/2006" xmlns:p14="http://schemas.microsoft.com/office/powerpoint/2010/main">
-    <mc:Choice Requires="p14">
-      <p:transition spd="med" p14:dur="700">
-        <p:fade/>
-      </p:transition>
-    </mc:Choice>
-    <mc:Fallback xmlns="">
-      <p:transition spd="med">
-        <p:fade/>
-      </p:transition>
-    </mc:Fallback>
-  </mc:AlternateContent>
 </p:sld>
 </file>
 
@@ -4671,231 +3682,12 @@
           <a:chExt cx="0" cy="0"/>
         </a:xfrm>
       </p:grpSpPr>
-      <p:sp>
-        <p:nvSpPr>
-          <p:cNvPr id="3" name="TextBox 2"/>
-          <p:cNvSpPr txBox="1"/>
-          <p:nvPr/>
-        </p:nvSpPr>
-        <p:spPr>
-          <a:xfrm>
-            <a:off x="1271768" y="1116000"/>
-            <a:ext cx="9137152" cy="2246769"/>
-          </a:xfrm>
-          <a:prstGeom prst="rect">
-            <a:avLst/>
-          </a:prstGeom>
-          <a:noFill/>
-        </p:spPr>
-        <p:txBody>
-          <a:bodyPr wrap="square" rtlCol="0">
-            <a:spAutoFit/>
-          </a:bodyPr>
-          <a:lstStyle/>
-          <a:p>
-            <a:pPr marL="514350" indent="-514350">
-              <a:buFont typeface="+mj-lt"/>
-              <a:buAutoNum type="arabicPeriod"/>
-            </a:pPr>
-            <a:r>
-              <a:rPr lang="en-US" sz="3500" b="1" dirty="0">
-                <a:solidFill>
-                  <a:schemeClr val="accent1"/>
-                </a:solidFill>
-                <a:latin typeface="Cambria" panose="02040503050406030204" pitchFamily="18" charset="0"/>
-              </a:rPr>
-              <a:t>LIST OPEN ISSUES SEEN SO FAR</a:t>
-            </a:r>
-            <a:br>
-              <a:rPr lang="en-US" sz="3500" b="1" dirty="0">
-                <a:solidFill>
-                  <a:schemeClr val="accent1"/>
-                </a:solidFill>
-                <a:latin typeface="Cambria" panose="02040503050406030204" pitchFamily="18" charset="0"/>
-              </a:rPr>
-            </a:br>
-            <a:endParaRPr lang="en-US" sz="3500" b="1" dirty="0">
-              <a:solidFill>
-                <a:schemeClr val="accent1"/>
-              </a:solidFill>
-              <a:latin typeface="Cambria" panose="02040503050406030204" pitchFamily="18" charset="0"/>
-            </a:endParaRPr>
-          </a:p>
-          <a:p>
-            <a:pPr marL="514350" indent="-514350">
-              <a:buFont typeface="+mj-lt"/>
-              <a:buAutoNum type="arabicPeriod"/>
-            </a:pPr>
-            <a:r>
-              <a:rPr lang="en-US" sz="3500" b="1" dirty="0">
-                <a:solidFill>
-                  <a:schemeClr val="accent1"/>
-                </a:solidFill>
-                <a:latin typeface="Cambria" panose="02040503050406030204" pitchFamily="18" charset="0"/>
-              </a:rPr>
-              <a:t>WHAT ABOUT TECHNICAL, BUSINESS, POLICY BASED OPEN ISSUES?</a:t>
-            </a:r>
-          </a:p>
-        </p:txBody>
-      </p:sp>
-    </p:spTree>
-    <p:extLst>
-      <p:ext uri="{BB962C8B-B14F-4D97-AF65-F5344CB8AC3E}">
-        <p14:creationId xmlns:p14="http://schemas.microsoft.com/office/powerpoint/2010/main" val="1412673654"/>
-      </p:ext>
-    </p:extLst>
-  </p:cSld>
-  <p:clrMapOvr>
-    <a:masterClrMapping/>
-  </p:clrMapOvr>
-  <mc:AlternateContent xmlns:mc="http://schemas.openxmlformats.org/markup-compatibility/2006" xmlns:p14="http://schemas.microsoft.com/office/powerpoint/2010/main">
-    <mc:Choice Requires="p14">
-      <p:transition spd="med" p14:dur="700">
-        <p:fade/>
-      </p:transition>
-    </mc:Choice>
-    <mc:Fallback xmlns="">
-      <p:transition spd="med">
-        <p:fade/>
-      </p:transition>
-    </mc:Fallback>
-  </mc:AlternateContent>
-</p:sld>
-</file>
-
-<file path=ppt/slides/slide4.xml><?xml version="1.0" encoding="utf-8"?>
-<p:sld xmlns:a="http://schemas.openxmlformats.org/drawingml/2006/main" xmlns:r="http://schemas.openxmlformats.org/officeDocument/2006/relationships" xmlns:p="http://schemas.openxmlformats.org/presentationml/2006/main">
-  <p:cSld>
-    <p:spTree>
-      <p:nvGrpSpPr>
-        <p:cNvPr id="1" name=""/>
-        <p:cNvGrpSpPr/>
-        <p:nvPr/>
-      </p:nvGrpSpPr>
-      <p:grpSpPr>
-        <a:xfrm>
-          <a:off x="0" y="0"/>
-          <a:ext cx="0" cy="0"/>
-          <a:chOff x="0" y="0"/>
-          <a:chExt cx="0" cy="0"/>
-        </a:xfrm>
-      </p:grpSpPr>
-      <p:sp>
-        <p:nvSpPr>
-          <p:cNvPr id="8" name="TextBox 7"/>
-          <p:cNvSpPr txBox="1"/>
-          <p:nvPr/>
-        </p:nvSpPr>
-        <p:spPr>
-          <a:xfrm>
-            <a:off x="1271768" y="1115051"/>
-            <a:ext cx="9196386" cy="630942"/>
-          </a:xfrm>
-          <a:prstGeom prst="rect">
-            <a:avLst/>
-          </a:prstGeom>
-          <a:noFill/>
-        </p:spPr>
-        <p:txBody>
-          <a:bodyPr wrap="square" rtlCol="0">
-            <a:spAutoFit/>
-          </a:bodyPr>
-          <a:lstStyle/>
-          <a:p>
-            <a:r>
-              <a:rPr lang="en-US" sz="3500" b="1" dirty="0">
-                <a:solidFill>
-                  <a:schemeClr val="accent1"/>
-                </a:solidFill>
-                <a:latin typeface="Cambria" panose="02040503050406030204" pitchFamily="18" charset="0"/>
-              </a:rPr>
-              <a:t>DISCOVERY VS. IMPLEMENTATION</a:t>
-            </a:r>
-          </a:p>
-        </p:txBody>
-      </p:sp>
-    </p:spTree>
-    <p:extLst>
-      <p:ext uri="{BB962C8B-B14F-4D97-AF65-F5344CB8AC3E}">
-        <p14:creationId xmlns:p14="http://schemas.microsoft.com/office/powerpoint/2010/main" val="1601071183"/>
-      </p:ext>
-    </p:extLst>
-  </p:cSld>
-  <p:clrMapOvr>
-    <a:masterClrMapping/>
-  </p:clrMapOvr>
-  <mc:AlternateContent xmlns:mc="http://schemas.openxmlformats.org/markup-compatibility/2006" xmlns:p14="http://schemas.microsoft.com/office/powerpoint/2010/main">
-    <mc:Choice Requires="p14">
-      <p:transition spd="med" p14:dur="700">
-        <p:fade/>
-      </p:transition>
-    </mc:Choice>
-    <mc:Fallback xmlns="">
-      <p:transition spd="med">
-        <p:fade/>
-      </p:transition>
-    </mc:Fallback>
-  </mc:AlternateContent>
-</p:sld>
-</file>
-
-<file path=ppt/slides/slide5.xml><?xml version="1.0" encoding="utf-8"?>
-<p:sld xmlns:a="http://schemas.openxmlformats.org/drawingml/2006/main" xmlns:r="http://schemas.openxmlformats.org/officeDocument/2006/relationships" xmlns:p="http://schemas.openxmlformats.org/presentationml/2006/main">
-  <p:cSld>
-    <p:spTree>
-      <p:nvGrpSpPr>
-        <p:cNvPr id="1" name=""/>
-        <p:cNvGrpSpPr/>
-        <p:nvPr/>
-      </p:nvGrpSpPr>
-      <p:grpSpPr>
-        <a:xfrm>
-          <a:off x="0" y="0"/>
-          <a:ext cx="0" cy="0"/>
-          <a:chOff x="0" y="0"/>
-          <a:chExt cx="0" cy="0"/>
-        </a:xfrm>
-      </p:grpSpPr>
-      <p:sp>
-        <p:nvSpPr>
-          <p:cNvPr id="8" name="TextBox 7"/>
-          <p:cNvSpPr txBox="1"/>
-          <p:nvPr/>
-        </p:nvSpPr>
-        <p:spPr>
-          <a:xfrm>
-            <a:off x="1271768" y="1115051"/>
-            <a:ext cx="9196386" cy="553998"/>
-          </a:xfrm>
-          <a:prstGeom prst="rect">
-            <a:avLst/>
-          </a:prstGeom>
-          <a:noFill/>
-        </p:spPr>
-        <p:txBody>
-          <a:bodyPr wrap="square" rtlCol="0">
-            <a:spAutoFit/>
-          </a:bodyPr>
-          <a:lstStyle/>
-          <a:p>
-            <a:r>
-              <a:rPr lang="en-US" sz="3000" b="1" dirty="0">
-                <a:solidFill>
-                  <a:schemeClr val="accent1"/>
-                </a:solidFill>
-                <a:latin typeface="Cambria" panose="02040503050406030204" pitchFamily="18" charset="0"/>
-              </a:rPr>
-              <a:t>FAST-PACED RESEARCH</a:t>
-            </a:r>
-          </a:p>
-        </p:txBody>
-      </p:sp>
       <p:pic>
         <p:nvPicPr>
           <p:cNvPr id="2" name="Picture 1">
             <a:extLst>
               <a:ext uri="{FF2B5EF4-FFF2-40B4-BE49-F238E27FC236}">
-                <a16:creationId xmlns:a16="http://schemas.microsoft.com/office/drawing/2014/main" id="{F775623E-65D5-C14D-BE8D-27E40447E437}"/>
+                <a16:creationId xmlns:a16="http://schemas.microsoft.com/office/drawing/2014/main" id="{5E3A983A-4766-764A-837F-FB1509EA167C}"/>
               </a:ext>
             </a:extLst>
           </p:cNvPr>
@@ -4912,224 +3704,20 @@
         </p:blipFill>
         <p:spPr>
           <a:xfrm>
-            <a:off x="1271768" y="4490384"/>
-            <a:ext cx="4077970" cy="734931"/>
+            <a:off x="1470660" y="998048"/>
+            <a:ext cx="9731674" cy="3863511"/>
           </a:xfrm>
           <a:prstGeom prst="rect">
             <a:avLst/>
           </a:prstGeom>
         </p:spPr>
       </p:pic>
-      <p:pic>
-        <p:nvPicPr>
-          <p:cNvPr id="3" name="Picture 2">
+      <p:sp>
+        <p:nvSpPr>
+          <p:cNvPr id="4" name="TextBox 3">
             <a:extLst>
               <a:ext uri="{FF2B5EF4-FFF2-40B4-BE49-F238E27FC236}">
-                <a16:creationId xmlns:a16="http://schemas.microsoft.com/office/drawing/2014/main" id="{9DCB433B-B7F5-C64F-B506-37F9A6C5FA0D}"/>
-              </a:ext>
-            </a:extLst>
-          </p:cNvPr>
-          <p:cNvPicPr>
-            <a:picLocks noChangeAspect="1"/>
-          </p:cNvPicPr>
-          <p:nvPr/>
-        </p:nvPicPr>
-        <p:blipFill>
-          <a:blip r:embed="rId4"/>
-          <a:stretch>
-            <a:fillRect/>
-          </a:stretch>
-        </p:blipFill>
-        <p:spPr>
-          <a:xfrm>
-            <a:off x="1271768" y="2010638"/>
-            <a:ext cx="7217891" cy="1592259"/>
-          </a:xfrm>
-          <a:prstGeom prst="rect">
-            <a:avLst/>
-          </a:prstGeom>
-        </p:spPr>
-      </p:pic>
-      <p:sp>
-        <p:nvSpPr>
-          <p:cNvPr id="4" name="Rectangle 3">
-            <a:extLst>
-              <a:ext uri="{FF2B5EF4-FFF2-40B4-BE49-F238E27FC236}">
-                <a16:creationId xmlns:a16="http://schemas.microsoft.com/office/drawing/2014/main" id="{27B2E59B-9E56-A245-BD7D-CA4C77573185}"/>
-              </a:ext>
-            </a:extLst>
-          </p:cNvPr>
-          <p:cNvSpPr/>
-          <p:nvPr/>
-        </p:nvSpPr>
-        <p:spPr>
-          <a:xfrm>
-            <a:off x="1203188" y="3677308"/>
-            <a:ext cx="1795171" cy="369332"/>
-          </a:xfrm>
-          <a:prstGeom prst="rect">
-            <a:avLst/>
-          </a:prstGeom>
-        </p:spPr>
-        <p:txBody>
-          <a:bodyPr wrap="none">
-            <a:spAutoFit/>
-          </a:bodyPr>
-          <a:lstStyle/>
-          <a:p>
-            <a:r>
-              <a:rPr lang="fr-FR" dirty="0">
-                <a:hlinkClick r:id="rId5"/>
-              </a:rPr>
-              <a:t>https://</a:t>
-            </a:r>
-            <a:r>
-              <a:rPr lang="fr-FR" dirty="0" err="1">
-                <a:hlinkClick r:id="rId5"/>
-              </a:rPr>
-              <a:t>arxiv.org</a:t>
-            </a:r>
-            <a:r>
-              <a:rPr lang="fr-FR" dirty="0">
-                <a:hlinkClick r:id="rId5"/>
-              </a:rPr>
-              <a:t>/</a:t>
-            </a:r>
-            <a:endParaRPr lang="fr-FR" dirty="0"/>
-          </a:p>
-        </p:txBody>
-      </p:sp>
-      <p:sp>
-        <p:nvSpPr>
-          <p:cNvPr id="5" name="Rectangle 4">
-            <a:extLst>
-              <a:ext uri="{FF2B5EF4-FFF2-40B4-BE49-F238E27FC236}">
-                <a16:creationId xmlns:a16="http://schemas.microsoft.com/office/drawing/2014/main" id="{A2004A09-C25B-724F-B3F1-7D5ABD20CC9D}"/>
-              </a:ext>
-            </a:extLst>
-          </p:cNvPr>
-          <p:cNvSpPr/>
-          <p:nvPr/>
-        </p:nvSpPr>
-        <p:spPr>
-          <a:xfrm>
-            <a:off x="1203188" y="5484393"/>
-            <a:ext cx="2961965" cy="369332"/>
-          </a:xfrm>
-          <a:prstGeom prst="rect">
-            <a:avLst/>
-          </a:prstGeom>
-        </p:spPr>
-        <p:txBody>
-          <a:bodyPr wrap="none">
-            <a:spAutoFit/>
-          </a:bodyPr>
-          <a:lstStyle/>
-          <a:p>
-            <a:r>
-              <a:rPr lang="fr-FR" dirty="0">
-                <a:hlinkClick r:id="rId6"/>
-              </a:rPr>
-              <a:t>http://</a:t>
-            </a:r>
-            <a:r>
-              <a:rPr lang="fr-FR" dirty="0" err="1">
-                <a:hlinkClick r:id="rId6"/>
-              </a:rPr>
-              <a:t>www.arxiv-sanity.com</a:t>
-            </a:r>
-            <a:r>
-              <a:rPr lang="fr-FR" dirty="0">
-                <a:hlinkClick r:id="rId6"/>
-              </a:rPr>
-              <a:t>/</a:t>
-            </a:r>
-            <a:endParaRPr lang="fr-FR" dirty="0"/>
-          </a:p>
-        </p:txBody>
-      </p:sp>
-    </p:spTree>
-    <p:extLst>
-      <p:ext uri="{BB962C8B-B14F-4D97-AF65-F5344CB8AC3E}">
-        <p14:creationId xmlns:p14="http://schemas.microsoft.com/office/powerpoint/2010/main" val="1793849361"/>
-      </p:ext>
-    </p:extLst>
-  </p:cSld>
-  <p:clrMapOvr>
-    <a:masterClrMapping/>
-  </p:clrMapOvr>
-  <mc:AlternateContent xmlns:mc="http://schemas.openxmlformats.org/markup-compatibility/2006" xmlns:p14="http://schemas.microsoft.com/office/powerpoint/2010/main">
-    <mc:Choice Requires="p14">
-      <p:transition spd="med" p14:dur="700">
-        <p:fade/>
-      </p:transition>
-    </mc:Choice>
-    <mc:Fallback xmlns="">
-      <p:transition spd="med">
-        <p:fade/>
-      </p:transition>
-    </mc:Fallback>
-  </mc:AlternateContent>
-</p:sld>
-</file>
-
-<file path=ppt/slides/slide6.xml><?xml version="1.0" encoding="utf-8"?>
-<p:sld xmlns:a="http://schemas.openxmlformats.org/drawingml/2006/main" xmlns:r="http://schemas.openxmlformats.org/officeDocument/2006/relationships" xmlns:p="http://schemas.openxmlformats.org/presentationml/2006/main">
-  <p:cSld>
-    <p:spTree>
-      <p:nvGrpSpPr>
-        <p:cNvPr id="1" name=""/>
-        <p:cNvGrpSpPr/>
-        <p:nvPr/>
-      </p:nvGrpSpPr>
-      <p:grpSpPr>
-        <a:xfrm>
-          <a:off x="0" y="0"/>
-          <a:ext cx="0" cy="0"/>
-          <a:chOff x="0" y="0"/>
-          <a:chExt cx="0" cy="0"/>
-        </a:xfrm>
-      </p:grpSpPr>
-      <p:sp>
-        <p:nvSpPr>
-          <p:cNvPr id="8" name="TextBox 7"/>
-          <p:cNvSpPr txBox="1"/>
-          <p:nvPr/>
-        </p:nvSpPr>
-        <p:spPr>
-          <a:xfrm>
-            <a:off x="1271768" y="1115051"/>
-            <a:ext cx="9196386" cy="553998"/>
-          </a:xfrm>
-          <a:prstGeom prst="rect">
-            <a:avLst/>
-          </a:prstGeom>
-          <a:noFill/>
-        </p:spPr>
-        <p:txBody>
-          <a:bodyPr wrap="square" rtlCol="0">
-            <a:spAutoFit/>
-          </a:bodyPr>
-          <a:lstStyle/>
-          <a:p>
-            <a:r>
-              <a:rPr lang="en-US" sz="3000" b="1" dirty="0">
-                <a:solidFill>
-                  <a:schemeClr val="accent1"/>
-                </a:solidFill>
-                <a:latin typeface="Cambria" panose="02040503050406030204" pitchFamily="18" charset="0"/>
-              </a:rPr>
-              <a:t>FROM ACADEMY TO INDUSTRY</a:t>
-            </a:r>
-          </a:p>
-        </p:txBody>
-      </p:sp>
-      <p:sp>
-        <p:nvSpPr>
-          <p:cNvPr id="6" name="TextBox 5">
-            <a:extLst>
-              <a:ext uri="{FF2B5EF4-FFF2-40B4-BE49-F238E27FC236}">
-                <a16:creationId xmlns:a16="http://schemas.microsoft.com/office/drawing/2014/main" id="{80CDDE41-8C09-D54C-917C-9FB77CE4824D}"/>
+                <a16:creationId xmlns:a16="http://schemas.microsoft.com/office/drawing/2014/main" id="{C109E4BD-0312-A348-BE37-14405B0BEFDE}"/>
               </a:ext>
             </a:extLst>
           </p:cNvPr>
@@ -5138,8 +3726,8 @@
         </p:nvSpPr>
         <p:spPr>
           <a:xfrm>
-            <a:off x="1275701" y="2333156"/>
-            <a:ext cx="9909364" cy="1938992"/>
+            <a:off x="1470660" y="5021580"/>
+            <a:ext cx="5367110" cy="369332"/>
           </a:xfrm>
           <a:prstGeom prst="rect">
             <a:avLst/>
@@ -5147,81 +3735,50 @@
           <a:noFill/>
         </p:spPr>
         <p:txBody>
-          <a:bodyPr wrap="square" rtlCol="0">
+          <a:bodyPr wrap="none" rtlCol="0">
             <a:spAutoFit/>
           </a:bodyPr>
           <a:lstStyle/>
           <a:p>
-            <a:pPr marL="342900" indent="-342900">
-              <a:buFont typeface="Arial"/>
-              <a:buChar char="•"/>
-            </a:pPr>
-            <a:r>
-              <a:rPr lang="en-US" sz="2400" b="1" dirty="0">
-                <a:solidFill>
-                  <a:schemeClr val="accent1"/>
-                </a:solidFill>
-                <a:latin typeface="Cambria" panose="02040503050406030204" pitchFamily="18" charset="0"/>
-              </a:rPr>
-              <a:t>LACK OF PRACTICAL RESULTS</a:t>
-            </a:r>
-            <a:br>
-              <a:rPr lang="en-US" sz="2400" b="1" dirty="0">
-                <a:solidFill>
-                  <a:schemeClr val="accent1"/>
-                </a:solidFill>
-                <a:latin typeface="Cambria" panose="02040503050406030204" pitchFamily="18" charset="0"/>
-              </a:rPr>
-            </a:br>
-            <a:endParaRPr lang="en-US" sz="2400" b="1" dirty="0">
-              <a:solidFill>
-                <a:schemeClr val="accent1"/>
-              </a:solidFill>
-              <a:latin typeface="Cambria" panose="02040503050406030204" pitchFamily="18" charset="0"/>
-            </a:endParaRPr>
-          </a:p>
-          <a:p>
-            <a:pPr marL="342900" indent="-342900">
-              <a:buFont typeface="Arial"/>
-              <a:buChar char="•"/>
-            </a:pPr>
-            <a:r>
-              <a:rPr lang="en-US" sz="2400" b="1" dirty="0">
-                <a:solidFill>
-                  <a:schemeClr val="accent1"/>
-                </a:solidFill>
-                <a:latin typeface="Cambria" panose="02040503050406030204" pitchFamily="18" charset="0"/>
-              </a:rPr>
-              <a:t>EXPECTATIONS RAISE TO HIGH</a:t>
-            </a:r>
-            <a:br>
-              <a:rPr lang="en-US" sz="2400" b="1" dirty="0">
-                <a:solidFill>
-                  <a:schemeClr val="accent1"/>
-                </a:solidFill>
-                <a:latin typeface="Cambria" panose="02040503050406030204" pitchFamily="18" charset="0"/>
-              </a:rPr>
-            </a:br>
-            <a:endParaRPr lang="en-US" sz="2400" b="1" dirty="0">
-              <a:solidFill>
-                <a:schemeClr val="accent1"/>
-              </a:solidFill>
-              <a:latin typeface="Cambria" panose="02040503050406030204" pitchFamily="18" charset="0"/>
-            </a:endParaRPr>
-          </a:p>
-          <a:p>
-            <a:pPr marL="342900" indent="-342900">
-              <a:buFont typeface="Arial"/>
-              <a:buChar char="•"/>
-            </a:pPr>
-            <a:r>
-              <a:rPr lang="en-US" sz="2400" b="1" dirty="0">
-                <a:solidFill>
-                  <a:schemeClr val="accent1"/>
-                </a:solidFill>
-                <a:latin typeface="Cambria" panose="02040503050406030204" pitchFamily="18" charset="0"/>
-              </a:rPr>
-              <a:t>CONTROVERSY BETWEEN DIFFERENT SCHOOLS OF THOUGHT</a:t>
+            <a:r>
+              <a:rPr lang="fr-FR" dirty="0" err="1"/>
+              <a:t>Decision</a:t>
+            </a:r>
+            <a:r>
+              <a:rPr lang="fr-FR" dirty="0"/>
+              <a:t> </a:t>
+            </a:r>
+            <a:r>
+              <a:rPr lang="fr-FR" dirty="0" err="1"/>
+              <a:t>tree</a:t>
+            </a:r>
+            <a:r>
+              <a:rPr lang="fr-FR" dirty="0"/>
+              <a:t> for </a:t>
+            </a:r>
+            <a:r>
+              <a:rPr lang="fr-FR" dirty="0" err="1"/>
+              <a:t>cost</a:t>
+            </a:r>
+            <a:r>
+              <a:rPr lang="fr-FR" dirty="0"/>
+              <a:t> </a:t>
+            </a:r>
+            <a:r>
+              <a:rPr lang="fr-FR" dirty="0" err="1"/>
+              <a:t>reduction</a:t>
+            </a:r>
+            <a:r>
+              <a:rPr lang="fr-FR" dirty="0"/>
+              <a:t> AI </a:t>
+            </a:r>
+            <a:r>
+              <a:rPr lang="fr-FR" dirty="0" err="1"/>
+              <a:t>projects</a:t>
+            </a:r>
+            <a:r>
+              <a:rPr lang="fr-FR" dirty="0"/>
+              <a:t>. Source IBM</a:t>
             </a:r>
           </a:p>
         </p:txBody>
@@ -5229,235 +3786,7 @@
     </p:spTree>
     <p:extLst>
       <p:ext uri="{BB962C8B-B14F-4D97-AF65-F5344CB8AC3E}">
-        <p14:creationId xmlns:p14="http://schemas.microsoft.com/office/powerpoint/2010/main" val="844135640"/>
-      </p:ext>
-    </p:extLst>
-  </p:cSld>
-  <p:clrMapOvr>
-    <a:masterClrMapping/>
-  </p:clrMapOvr>
-  <mc:AlternateContent xmlns:mc="http://schemas.openxmlformats.org/markup-compatibility/2006" xmlns:p14="http://schemas.microsoft.com/office/powerpoint/2010/main">
-    <mc:Choice Requires="p14">
-      <p:transition spd="med" p14:dur="700">
-        <p:fade/>
-      </p:transition>
-    </mc:Choice>
-    <mc:Fallback xmlns="">
-      <p:transition spd="med">
-        <p:fade/>
-      </p:transition>
-    </mc:Fallback>
-  </mc:AlternateContent>
-</p:sld>
-</file>
-
-<file path=ppt/slides/slide7.xml><?xml version="1.0" encoding="utf-8"?>
-<p:sld xmlns:a="http://schemas.openxmlformats.org/drawingml/2006/main" xmlns:r="http://schemas.openxmlformats.org/officeDocument/2006/relationships" xmlns:p="http://schemas.openxmlformats.org/presentationml/2006/main">
-  <p:cSld>
-    <p:spTree>
-      <p:nvGrpSpPr>
-        <p:cNvPr id="1" name=""/>
-        <p:cNvGrpSpPr/>
-        <p:nvPr/>
-      </p:nvGrpSpPr>
-      <p:grpSpPr>
-        <a:xfrm>
-          <a:off x="0" y="0"/>
-          <a:ext cx="0" cy="0"/>
-          <a:chOff x="0" y="0"/>
-          <a:chExt cx="0" cy="0"/>
-        </a:xfrm>
-      </p:grpSpPr>
-      <p:sp>
-        <p:nvSpPr>
-          <p:cNvPr id="8" name="TextBox 7"/>
-          <p:cNvSpPr txBox="1"/>
-          <p:nvPr/>
-        </p:nvSpPr>
-        <p:spPr>
-          <a:xfrm>
-            <a:off x="1271768" y="1115051"/>
-            <a:ext cx="9196386" cy="630942"/>
-          </a:xfrm>
-          <a:prstGeom prst="rect">
-            <a:avLst/>
-          </a:prstGeom>
-          <a:noFill/>
-        </p:spPr>
-        <p:txBody>
-          <a:bodyPr wrap="square" rtlCol="0">
-            <a:spAutoFit/>
-          </a:bodyPr>
-          <a:lstStyle/>
-          <a:p>
-            <a:r>
-              <a:rPr lang="en-US" sz="3500" b="1" dirty="0">
-                <a:solidFill>
-                  <a:schemeClr val="accent1"/>
-                </a:solidFill>
-                <a:latin typeface="Cambria" panose="02040503050406030204" pitchFamily="18" charset="0"/>
-              </a:rPr>
-              <a:t>NARROW VS. GENERAL INTELLIGENCE</a:t>
-            </a:r>
-          </a:p>
-        </p:txBody>
-      </p:sp>
-    </p:spTree>
-    <p:extLst>
-      <p:ext uri="{BB962C8B-B14F-4D97-AF65-F5344CB8AC3E}">
-        <p14:creationId xmlns:p14="http://schemas.microsoft.com/office/powerpoint/2010/main" val="1581891547"/>
-      </p:ext>
-    </p:extLst>
-  </p:cSld>
-  <p:clrMapOvr>
-    <a:masterClrMapping/>
-  </p:clrMapOvr>
-  <mc:AlternateContent xmlns:mc="http://schemas.openxmlformats.org/markup-compatibility/2006" xmlns:p14="http://schemas.microsoft.com/office/powerpoint/2010/main">
-    <mc:Choice Requires="p14">
-      <p:transition spd="med" p14:dur="700">
-        <p:fade/>
-      </p:transition>
-    </mc:Choice>
-    <mc:Fallback xmlns="">
-      <p:transition spd="med">
-        <p:fade/>
-      </p:transition>
-    </mc:Fallback>
-  </mc:AlternateContent>
-</p:sld>
-</file>
-
-<file path=ppt/slides/slide8.xml><?xml version="1.0" encoding="utf-8"?>
-<p:sld xmlns:a="http://schemas.openxmlformats.org/drawingml/2006/main" xmlns:r="http://schemas.openxmlformats.org/officeDocument/2006/relationships" xmlns:p="http://schemas.openxmlformats.org/presentationml/2006/main">
-  <p:cSld>
-    <p:spTree>
-      <p:nvGrpSpPr>
-        <p:cNvPr id="1" name=""/>
-        <p:cNvGrpSpPr/>
-        <p:nvPr/>
-      </p:nvGrpSpPr>
-      <p:grpSpPr>
-        <a:xfrm>
-          <a:off x="0" y="0"/>
-          <a:ext cx="0" cy="0"/>
-          <a:chOff x="0" y="0"/>
-          <a:chExt cx="0" cy="0"/>
-        </a:xfrm>
-      </p:grpSpPr>
-      <p:sp>
-        <p:nvSpPr>
-          <p:cNvPr id="8" name="TextBox 7"/>
-          <p:cNvSpPr txBox="1"/>
-          <p:nvPr/>
-        </p:nvSpPr>
-        <p:spPr>
-          <a:xfrm>
-            <a:off x="1271768" y="1115051"/>
-            <a:ext cx="9196386" cy="630942"/>
-          </a:xfrm>
-          <a:prstGeom prst="rect">
-            <a:avLst/>
-          </a:prstGeom>
-          <a:noFill/>
-        </p:spPr>
-        <p:txBody>
-          <a:bodyPr wrap="square" rtlCol="0">
-            <a:spAutoFit/>
-          </a:bodyPr>
-          <a:lstStyle/>
-          <a:p>
-            <a:r>
-              <a:rPr lang="en-US" sz="3500" b="1" dirty="0">
-                <a:solidFill>
-                  <a:schemeClr val="accent1"/>
-                </a:solidFill>
-                <a:latin typeface="Cambria" panose="02040503050406030204" pitchFamily="18" charset="0"/>
-              </a:rPr>
-              <a:t>DATA GREEDINESS</a:t>
-            </a:r>
-          </a:p>
-        </p:txBody>
-      </p:sp>
-    </p:spTree>
-    <p:extLst>
-      <p:ext uri="{BB962C8B-B14F-4D97-AF65-F5344CB8AC3E}">
-        <p14:creationId xmlns:p14="http://schemas.microsoft.com/office/powerpoint/2010/main" val="1108266415"/>
-      </p:ext>
-    </p:extLst>
-  </p:cSld>
-  <p:clrMapOvr>
-    <a:masterClrMapping/>
-  </p:clrMapOvr>
-  <mc:AlternateContent xmlns:mc="http://schemas.openxmlformats.org/markup-compatibility/2006" xmlns:p14="http://schemas.microsoft.com/office/powerpoint/2010/main">
-    <mc:Choice Requires="p14">
-      <p:transition spd="med" p14:dur="700">
-        <p:fade/>
-      </p:transition>
-    </mc:Choice>
-    <mc:Fallback xmlns="">
-      <p:transition spd="med">
-        <p:fade/>
-      </p:transition>
-    </mc:Fallback>
-  </mc:AlternateContent>
-</p:sld>
-</file>
-
-<file path=ppt/slides/slide9.xml><?xml version="1.0" encoding="utf-8"?>
-<p:sld xmlns:a="http://schemas.openxmlformats.org/drawingml/2006/main" xmlns:r="http://schemas.openxmlformats.org/officeDocument/2006/relationships" xmlns:p="http://schemas.openxmlformats.org/presentationml/2006/main">
-  <p:cSld>
-    <p:spTree>
-      <p:nvGrpSpPr>
-        <p:cNvPr id="1" name=""/>
-        <p:cNvGrpSpPr/>
-        <p:nvPr/>
-      </p:nvGrpSpPr>
-      <p:grpSpPr>
-        <a:xfrm>
-          <a:off x="0" y="0"/>
-          <a:ext cx="0" cy="0"/>
-          <a:chOff x="0" y="0"/>
-          <a:chExt cx="0" cy="0"/>
-        </a:xfrm>
-      </p:grpSpPr>
-      <p:sp>
-        <p:nvSpPr>
-          <p:cNvPr id="8" name="TextBox 7"/>
-          <p:cNvSpPr txBox="1"/>
-          <p:nvPr/>
-        </p:nvSpPr>
-        <p:spPr>
-          <a:xfrm>
-            <a:off x="1271768" y="1115051"/>
-            <a:ext cx="9196386" cy="1169551"/>
-          </a:xfrm>
-          <a:prstGeom prst="rect">
-            <a:avLst/>
-          </a:prstGeom>
-          <a:noFill/>
-        </p:spPr>
-        <p:txBody>
-          <a:bodyPr wrap="square" rtlCol="0">
-            <a:spAutoFit/>
-          </a:bodyPr>
-          <a:lstStyle/>
-          <a:p>
-            <a:r>
-              <a:rPr lang="en-US" sz="3500" b="1" dirty="0">
-                <a:solidFill>
-                  <a:schemeClr val="accent1"/>
-                </a:solidFill>
-                <a:latin typeface="Cambria" panose="02040503050406030204" pitchFamily="18" charset="0"/>
-              </a:rPr>
-              <a:t>ENTREPRENEURS &amp; VENTURE CAPITAL ECOSYSTEMS</a:t>
-            </a:r>
-          </a:p>
-        </p:txBody>
-      </p:sp>
-    </p:spTree>
-    <p:extLst>
-      <p:ext uri="{BB962C8B-B14F-4D97-AF65-F5344CB8AC3E}">
-        <p14:creationId xmlns:p14="http://schemas.microsoft.com/office/powerpoint/2010/main" val="983120470"/>
+        <p14:creationId xmlns:p14="http://schemas.microsoft.com/office/powerpoint/2010/main" val="1412673654"/>
       </p:ext>
     </p:extLst>
   </p:cSld>

</xml_diff>